<commit_message>
updates from the morning class
</commit_message>
<xml_diff>
--- a/format-encodings/documents/ARCHIVE/bitwise-operations.pptx
+++ b/format-encodings/documents/ARCHIVE/bitwise-operations.pptx
@@ -806,7 +806,7 @@
               </a:spcAft>
               <a:buNone/>
             </a:pPr>
-            <a:endParaRPr/>
+            <a:endParaRPr dirty="0"/>
           </a:p>
         </p:txBody>
       </p:sp>
@@ -1014,7 +1014,7 @@
               </a:spcAft>
               <a:buNone/>
             </a:pPr>
-            <a:endParaRPr/>
+            <a:endParaRPr dirty="0"/>
           </a:p>
         </p:txBody>
       </p:sp>
@@ -6063,7 +6063,7 @@
         </p:spPr>
         <p:txBody>
           <a:bodyPr spcFirstLastPara="1" wrap="square" lIns="91425" tIns="91425" rIns="91425" bIns="91425" anchor="t" anchorCtr="0">
-            <a:normAutofit fontScale="85000" lnSpcReduction="10000"/>
+            <a:normAutofit fontScale="85000" lnSpcReduction="20000"/>
           </a:bodyPr>
           <a:lstStyle/>
           <a:p>
@@ -6190,7 +6190,7 @@
                 <a:cs typeface="Source Code Pro"/>
                 <a:sym typeface="Source Code Pro"/>
               </a:rPr>
-              <a:t>s1 = ~ t1		nor $s1, $t1, $zero	# s1 = ~ ( t1 | 0 )</a:t>
+              <a:t>s1 = ~ t1;	nor $s1, $t1, $zero	# s1 = ~ ( t1 | 0 )</a:t>
             </a:r>
             <a:r>
               <a:rPr lang="en" dirty="0"/>
@@ -6220,7 +6220,7 @@
                 <a:cs typeface="Source Code Pro"/>
                 <a:sym typeface="Source Code Pro"/>
               </a:rPr>
-              <a:t>s1 = t1 &amp; t2	and $s1, $t1, $t2</a:t>
+              <a:t>s1 = t1 &amp; t2;	and $s1, $t1, $t2</a:t>
             </a:r>
             <a:endParaRPr dirty="0">
               <a:latin typeface="Source Code Pro"/>
@@ -6251,7 +6251,7 @@
                 <a:cs typeface="Source Code Pro"/>
                 <a:sym typeface="Source Code Pro"/>
               </a:rPr>
-              <a:t>s1 = t1 | t2	or $s1, $t1, $t2</a:t>
+              <a:t>s1 = t1 | t2;	or $s1, $t1, $t2</a:t>
             </a:r>
             <a:endParaRPr dirty="0">
               <a:latin typeface="Source Code Pro"/>
@@ -6286,7 +6286,7 @@
                 <a:cs typeface="Source Code Pro"/>
                 <a:sym typeface="Source Code Pro"/>
               </a:rPr>
-              <a:t>s1 = t1 ^ t2	</a:t>
+              <a:t>s1 = t1 ^ t2;	</a:t>
             </a:r>
             <a:r>
               <a:rPr lang="en" dirty="0" err="1">
@@ -6306,6 +6306,14 @@
               </a:rPr>
               <a:t> $s1, $t1, $t2</a:t>
             </a:r>
+            <a:br>
+              <a:rPr lang="en" dirty="0">
+                <a:latin typeface="Source Code Pro"/>
+                <a:ea typeface="Source Code Pro"/>
+                <a:cs typeface="Source Code Pro"/>
+                <a:sym typeface="Source Code Pro"/>
+              </a:rPr>
+            </a:br>
             <a:endParaRPr dirty="0">
               <a:latin typeface="Source Code Pro"/>
               <a:ea typeface="Source Code Pro"/>
@@ -6342,8 +6350,12 @@
               <a:buChar char="○"/>
             </a:pPr>
             <a:r>
+              <a:rPr lang="en" strike="sngStrike" dirty="0"/>
+              <a:t>Un/Signed</a:t>
+            </a:r>
+            <a:r>
               <a:rPr lang="en" dirty="0"/>
-              <a:t>Signed Left Shift	</a:t>
+              <a:t> Left Shift	</a:t>
             </a:r>
             <a:r>
               <a:rPr lang="en" dirty="0">
@@ -6352,7 +6364,7 @@
                 <a:cs typeface="Source Code Pro"/>
                 <a:sym typeface="Source Code Pro"/>
               </a:rPr>
-              <a:t>s1 = t1 &lt;&lt; 2	</a:t>
+              <a:t>s1 = t1 &lt;&lt; 2;	</a:t>
             </a:r>
             <a:r>
               <a:rPr lang="en" dirty="0" err="1">
@@ -6372,6 +6384,59 @@
               </a:rPr>
               <a:t> $s1, $t1, 2	# Shift Left Logical</a:t>
             </a:r>
+          </a:p>
+          <a:p>
+            <a:pPr lvl="1" indent="-304165">
+              <a:buSzPct val="100000"/>
+            </a:pPr>
+            <a:r>
+              <a:rPr lang="en-US" dirty="0"/>
+              <a:t>Unsigned Right Shift	</a:t>
+            </a:r>
+            <a:r>
+              <a:rPr lang="en-US" dirty="0">
+                <a:latin typeface="Source Code Pro"/>
+                <a:ea typeface="Source Code Pro"/>
+                <a:cs typeface="Source Code Pro"/>
+                <a:sym typeface="Source Code Pro"/>
+              </a:rPr>
+              <a:t>s1 = t1 &gt;&gt;&gt; 2;	</a:t>
+            </a:r>
+            <a:r>
+              <a:rPr lang="en-US" dirty="0" err="1">
+                <a:latin typeface="Source Code Pro"/>
+                <a:ea typeface="Source Code Pro"/>
+                <a:cs typeface="Source Code Pro"/>
+                <a:sym typeface="Source Code Pro"/>
+              </a:rPr>
+              <a:t>srl</a:t>
+            </a:r>
+            <a:r>
+              <a:rPr lang="en-US" dirty="0">
+                <a:latin typeface="Source Code Pro"/>
+                <a:ea typeface="Source Code Pro"/>
+                <a:cs typeface="Source Code Pro"/>
+                <a:sym typeface="Source Code Pro"/>
+              </a:rPr>
+              <a:t> $s1, $t1, 2	# Shift Right Logical</a:t>
+            </a:r>
+            <a:br>
+              <a:rPr lang="en-US" dirty="0">
+                <a:latin typeface="Source Code Pro"/>
+                <a:ea typeface="Source Code Pro"/>
+                <a:cs typeface="Source Code Pro"/>
+                <a:sym typeface="Source Code Pro"/>
+              </a:rPr>
+            </a:br>
+            <a:r>
+              <a:rPr lang="en-US" dirty="0">
+                <a:latin typeface="Source Code Pro"/>
+                <a:ea typeface="Source Code Pro"/>
+                <a:cs typeface="Source Code Pro"/>
+                <a:sym typeface="Source Code Pro"/>
+              </a:rPr>
+              <a:t> </a:t>
+            </a:r>
             <a:endParaRPr dirty="0">
               <a:latin typeface="Source Code Pro"/>
               <a:ea typeface="Source Code Pro"/>
@@ -6401,7 +6466,7 @@
                 <a:cs typeface="Source Code Pro"/>
                 <a:sym typeface="Source Code Pro"/>
               </a:rPr>
-              <a:t>s1 = t1 &gt;&gt; 2	</a:t>
+              <a:t>s1 = t1 &gt;&gt; 2;	</a:t>
             </a:r>
             <a:r>
               <a:rPr lang="en" dirty="0" err="1">
@@ -6451,58 +6516,9 @@
                 <a:cs typeface="Source Code Pro"/>
                 <a:sym typeface="Source Code Pro"/>
               </a:rPr>
-              <a:t>s1 = t1 &lt;&lt;&lt; t2</a:t>
+              <a:t>s1 = t1 &lt;&lt;&lt; t2;</a:t>
             </a:r>
             <a:endParaRPr dirty="0">
-              <a:latin typeface="Source Code Pro"/>
-              <a:ea typeface="Source Code Pro"/>
-              <a:cs typeface="Source Code Pro"/>
-              <a:sym typeface="Source Code Pro"/>
-            </a:endParaRPr>
-          </a:p>
-          <a:p>
-            <a:pPr marL="914400" lvl="1" indent="-304165" algn="l" rtl="0">
-              <a:spcBef>
-                <a:spcPts val="0"/>
-              </a:spcBef>
-              <a:spcAft>
-                <a:spcPts val="0"/>
-              </a:spcAft>
-              <a:buSzPct val="100000"/>
-              <a:buChar char="○"/>
-            </a:pPr>
-            <a:r>
-              <a:rPr lang="en" dirty="0"/>
-              <a:t>Unsigned Right Shift	</a:t>
-            </a:r>
-            <a:r>
-              <a:rPr lang="en" dirty="0">
-                <a:latin typeface="Source Code Pro"/>
-                <a:ea typeface="Source Code Pro"/>
-                <a:cs typeface="Source Code Pro"/>
-                <a:sym typeface="Source Code Pro"/>
-              </a:rPr>
-              <a:t>s1 = t1 &gt;&gt;&gt; 2	</a:t>
-            </a:r>
-            <a:r>
-              <a:rPr lang="en" dirty="0" err="1">
-                <a:latin typeface="Source Code Pro"/>
-                <a:ea typeface="Source Code Pro"/>
-                <a:cs typeface="Source Code Pro"/>
-                <a:sym typeface="Source Code Pro"/>
-              </a:rPr>
-              <a:t>srl</a:t>
-            </a:r>
-            <a:r>
-              <a:rPr lang="en" dirty="0">
-                <a:latin typeface="Source Code Pro"/>
-                <a:ea typeface="Source Code Pro"/>
-                <a:cs typeface="Source Code Pro"/>
-                <a:sym typeface="Source Code Pro"/>
-              </a:rPr>
-              <a:t> $s1, $t1, 2	# Shift Right Logical </a:t>
-            </a:r>
-            <a:endParaRPr strike="sngStrike" dirty="0">
               <a:latin typeface="Source Code Pro"/>
               <a:ea typeface="Source Code Pro"/>
               <a:cs typeface="Source Code Pro"/>
@@ -6694,10 +6710,10 @@
               <a:buNone/>
             </a:pPr>
             <a:r>
-              <a:rPr lang="en"/>
+              <a:rPr lang="en" dirty="0"/>
               <a:t>Boolean-based Bitwise Operations</a:t>
             </a:r>
-            <a:endParaRPr/>
+            <a:endParaRPr dirty="0"/>
           </a:p>
         </p:txBody>
       </p:sp>
@@ -12304,154 +12320,15 @@
                 <a:sym typeface="Source Code Pro"/>
               </a:rPr>
             </a:br>
-            <a:endParaRPr sz="500" dirty="0">
-              <a:latin typeface="Source Code Pro"/>
-              <a:ea typeface="Source Code Pro"/>
-              <a:cs typeface="Source Code Pro"/>
-              <a:sym typeface="Source Code Pro"/>
-            </a:endParaRPr>
-          </a:p>
-          <a:p>
-            <a:pPr marL="914400" lvl="1" indent="-317500" algn="l" rtl="0">
-              <a:spcBef>
-                <a:spcPts val="0"/>
-              </a:spcBef>
-              <a:spcAft>
-                <a:spcPts val="0"/>
-              </a:spcAft>
-              <a:buSzPts val="1400"/>
-              <a:buChar char="○"/>
-            </a:pPr>
-            <a:r>
-              <a:rPr lang="en" dirty="0"/>
-              <a:t>Shift Left Logical Variable	</a:t>
-            </a:r>
-            <a:r>
+            <a:br>
               <a:rPr lang="en" dirty="0">
                 <a:latin typeface="Source Code Pro"/>
                 <a:ea typeface="Source Code Pro"/>
                 <a:cs typeface="Source Code Pro"/>
                 <a:sym typeface="Source Code Pro"/>
               </a:rPr>
-              <a:t>s1 = t1 &lt;&lt; t2	</a:t>
-            </a:r>
-            <a:r>
-              <a:rPr lang="en" dirty="0" err="1">
-                <a:latin typeface="Source Code Pro"/>
-                <a:ea typeface="Source Code Pro"/>
-                <a:cs typeface="Source Code Pro"/>
-                <a:sym typeface="Source Code Pro"/>
-              </a:rPr>
-              <a:t>sllv</a:t>
-            </a:r>
-            <a:r>
-              <a:rPr lang="en" dirty="0">
-                <a:latin typeface="Source Code Pro"/>
-                <a:ea typeface="Source Code Pro"/>
-                <a:cs typeface="Source Code Pro"/>
-                <a:sym typeface="Source Code Pro"/>
-              </a:rPr>
-              <a:t> $s1, $t1, $t2</a:t>
-            </a:r>
-            <a:endParaRPr dirty="0">
-              <a:latin typeface="Source Code Pro"/>
-              <a:ea typeface="Source Code Pro"/>
-              <a:cs typeface="Source Code Pro"/>
-              <a:sym typeface="Source Code Pro"/>
-            </a:endParaRPr>
-          </a:p>
-          <a:p>
-            <a:pPr marL="914400" lvl="1" indent="-317500" algn="l" rtl="0">
-              <a:spcBef>
-                <a:spcPts val="0"/>
-              </a:spcBef>
-              <a:spcAft>
-                <a:spcPts val="0"/>
-              </a:spcAft>
-              <a:buSzPts val="1400"/>
-              <a:buChar char="○"/>
-            </a:pPr>
-            <a:r>
-              <a:rPr lang="en" dirty="0"/>
-              <a:t>Shift Right Logical Variable	</a:t>
-            </a:r>
-            <a:r>
-              <a:rPr lang="en" dirty="0">
-                <a:latin typeface="Source Code Pro"/>
-                <a:ea typeface="Source Code Pro"/>
-                <a:cs typeface="Source Code Pro"/>
-                <a:sym typeface="Source Code Pro"/>
-              </a:rPr>
-              <a:t>s1 = t1 &gt;&gt;&gt; t2	</a:t>
-            </a:r>
-            <a:r>
-              <a:rPr lang="en" dirty="0" err="1">
-                <a:latin typeface="Source Code Pro"/>
-                <a:ea typeface="Source Code Pro"/>
-                <a:cs typeface="Source Code Pro"/>
-                <a:sym typeface="Source Code Pro"/>
-              </a:rPr>
-              <a:t>srlv</a:t>
-            </a:r>
-            <a:r>
-              <a:rPr lang="en" dirty="0">
-                <a:latin typeface="Source Code Pro"/>
-                <a:ea typeface="Source Code Pro"/>
-                <a:cs typeface="Source Code Pro"/>
-                <a:sym typeface="Source Code Pro"/>
-              </a:rPr>
-              <a:t> $s1, $t1, $t2</a:t>
-            </a:r>
-            <a:endParaRPr dirty="0">
-              <a:latin typeface="Source Code Pro"/>
-              <a:ea typeface="Source Code Pro"/>
-              <a:cs typeface="Source Code Pro"/>
-              <a:sym typeface="Source Code Pro"/>
-            </a:endParaRPr>
-          </a:p>
-          <a:p>
-            <a:pPr marL="914400" lvl="1" indent="-317500" algn="l" rtl="0">
-              <a:spcBef>
-                <a:spcPts val="0"/>
-              </a:spcBef>
-              <a:spcAft>
-                <a:spcPts val="0"/>
-              </a:spcAft>
-              <a:buSzPts val="1400"/>
-              <a:buChar char="○"/>
-            </a:pPr>
-            <a:r>
-              <a:rPr lang="en" dirty="0"/>
-              <a:t>Shift Right Arithmetic Variable	</a:t>
-            </a:r>
-            <a:r>
-              <a:rPr lang="en" dirty="0">
-                <a:latin typeface="Source Code Pro"/>
-                <a:ea typeface="Source Code Pro"/>
-                <a:cs typeface="Source Code Pro"/>
-                <a:sym typeface="Source Code Pro"/>
-              </a:rPr>
-              <a:t>s1 = t1 &gt;&gt; t2	</a:t>
-            </a:r>
-            <a:r>
-              <a:rPr lang="en" dirty="0" err="1">
-                <a:latin typeface="Source Code Pro"/>
-                <a:ea typeface="Source Code Pro"/>
-                <a:cs typeface="Source Code Pro"/>
-                <a:sym typeface="Source Code Pro"/>
-              </a:rPr>
-              <a:t>srav</a:t>
-            </a:r>
-            <a:r>
-              <a:rPr lang="en" dirty="0">
-                <a:latin typeface="Source Code Pro"/>
-                <a:ea typeface="Source Code Pro"/>
-                <a:cs typeface="Source Code Pro"/>
-                <a:sym typeface="Source Code Pro"/>
-              </a:rPr>
-              <a:t> $s1, $t1, $t2</a:t>
-            </a:r>
-            <a:endParaRPr dirty="0">
+            </a:br>
+            <a:endParaRPr sz="500" dirty="0">
               <a:latin typeface="Source Code Pro"/>
               <a:ea typeface="Source Code Pro"/>
               <a:cs typeface="Source Code Pro"/>
@@ -12527,7 +12404,7 @@
         </p:nvGrpSpPr>
         <p:grpSpPr>
           <a:xfrm>
-            <a:off x="1065850" y="3950875"/>
+            <a:off x="1065850" y="3469185"/>
             <a:ext cx="1144800" cy="286200"/>
             <a:chOff x="2161225" y="2332350"/>
             <a:chExt cx="1144800" cy="286200"/>
@@ -12742,7 +12619,7 @@
         </p:nvGrpSpPr>
         <p:grpSpPr>
           <a:xfrm>
-            <a:off x="1065850" y="4560475"/>
+            <a:off x="1065850" y="4078785"/>
             <a:ext cx="1144800" cy="286200"/>
             <a:chOff x="2161225" y="2332350"/>
             <a:chExt cx="1144800" cy="286200"/>
@@ -12841,10 +12718,10 @@
                 <a:buNone/>
               </a:pPr>
               <a:r>
-                <a:rPr lang="en"/>
+                <a:rPr lang="en" dirty="0"/>
                 <a:t>1</a:t>
               </a:r>
-              <a:endParaRPr/>
+              <a:endParaRPr dirty="0"/>
             </a:p>
           </p:txBody>
         </p:sp>
@@ -12957,19 +12834,15 @@
         </p:nvSpPr>
         <p:spPr>
           <a:xfrm>
-            <a:off x="2457850" y="4560475"/>
+            <a:off x="2457850" y="4078785"/>
             <a:ext cx="286200" cy="286200"/>
           </a:xfrm>
           <a:prstGeom prst="rect">
             <a:avLst/>
           </a:prstGeom>
-          <a:solidFill>
-            <a:schemeClr val="lt2"/>
-          </a:solidFill>
+          <a:noFill/>
           <a:ln w="9525" cap="flat" cmpd="sng">
-            <a:solidFill>
-              <a:schemeClr val="dk2"/>
-            </a:solidFill>
+            <a:noFill/>
             <a:prstDash val="solid"/>
             <a:round/>
             <a:headEnd type="none" w="sm" len="sm"/>
@@ -13007,19 +12880,15 @@
         </p:nvSpPr>
         <p:spPr>
           <a:xfrm>
-            <a:off x="571900" y="4560475"/>
+            <a:off x="571900" y="4078785"/>
             <a:ext cx="286200" cy="286200"/>
           </a:xfrm>
           <a:prstGeom prst="rect">
             <a:avLst/>
           </a:prstGeom>
-          <a:solidFill>
-            <a:schemeClr val="lt2"/>
-          </a:solidFill>
+          <a:noFill/>
           <a:ln w="9525" cap="flat" cmpd="sng">
-            <a:solidFill>
-              <a:schemeClr val="dk2"/>
-            </a:solidFill>
+            <a:noFill/>
             <a:prstDash val="solid"/>
             <a:round/>
             <a:headEnd type="none" w="sm" len="sm"/>
@@ -13057,7 +12926,7 @@
         </p:nvSpPr>
         <p:spPr>
           <a:xfrm>
-            <a:off x="857250" y="3464225"/>
+            <a:off x="857250" y="2982535"/>
             <a:ext cx="1658100" cy="400200"/>
           </a:xfrm>
           <a:prstGeom prst="rect">
@@ -13095,6 +12964,7 @@
         <p:nvCxnSpPr>
           <p:cNvPr id="172" name="Google Shape;172;p15"/>
           <p:cNvCxnSpPr>
+            <a:cxnSpLocks/>
             <a:stCxn id="160" idx="2"/>
             <a:endCxn id="170" idx="0"/>
           </p:cNvCxnSpPr>
@@ -13102,7 +12972,7 @@
         </p:nvCxnSpPr>
         <p:spPr>
           <a:xfrm flipH="1">
-            <a:off x="714850" y="4237075"/>
+            <a:off x="714850" y="3755385"/>
             <a:ext cx="494100" cy="323400"/>
           </a:xfrm>
           <a:prstGeom prst="straightConnector1">
@@ -13131,7 +13001,7 @@
         </p:nvCxnSpPr>
         <p:spPr>
           <a:xfrm flipH="1">
-            <a:off x="1208950" y="4237075"/>
+            <a:off x="1208950" y="3755385"/>
             <a:ext cx="286200" cy="323400"/>
           </a:xfrm>
           <a:prstGeom prst="straightConnector1">
@@ -13160,7 +13030,7 @@
         </p:nvCxnSpPr>
         <p:spPr>
           <a:xfrm flipH="1">
-            <a:off x="1495150" y="4237075"/>
+            <a:off x="1495150" y="3755385"/>
             <a:ext cx="286200" cy="323400"/>
           </a:xfrm>
           <a:prstGeom prst="straightConnector1">
@@ -13189,7 +13059,7 @@
         </p:nvCxnSpPr>
         <p:spPr>
           <a:xfrm flipH="1">
-            <a:off x="1781350" y="4237075"/>
+            <a:off x="1781350" y="3755385"/>
             <a:ext cx="286200" cy="323400"/>
           </a:xfrm>
           <a:prstGeom prst="straightConnector1">
@@ -13218,7 +13088,7 @@
         </p:nvCxnSpPr>
         <p:spPr>
           <a:xfrm rot="10800000">
-            <a:off x="2210650" y="4703575"/>
+            <a:off x="2210650" y="4221885"/>
             <a:ext cx="247200" cy="0"/>
           </a:xfrm>
           <a:prstGeom prst="straightConnector1">
@@ -13244,7 +13114,7 @@
         </p:nvGrpSpPr>
         <p:grpSpPr>
           <a:xfrm>
-            <a:off x="3885250" y="3950875"/>
+            <a:off x="3885250" y="3469185"/>
             <a:ext cx="1144800" cy="286200"/>
             <a:chOff x="2161225" y="2332350"/>
             <a:chExt cx="1144800" cy="286200"/>
@@ -13459,7 +13329,7 @@
         </p:nvGrpSpPr>
         <p:grpSpPr>
           <a:xfrm>
-            <a:off x="3885250" y="4560475"/>
+            <a:off x="3885250" y="4078785"/>
             <a:ext cx="1144800" cy="286200"/>
             <a:chOff x="2161225" y="2332350"/>
             <a:chExt cx="1144800" cy="286200"/>
@@ -13674,19 +13544,15 @@
         </p:nvSpPr>
         <p:spPr>
           <a:xfrm>
-            <a:off x="5277250" y="4560475"/>
+            <a:off x="5277250" y="4078785"/>
             <a:ext cx="286200" cy="286200"/>
           </a:xfrm>
           <a:prstGeom prst="rect">
             <a:avLst/>
           </a:prstGeom>
-          <a:solidFill>
-            <a:schemeClr val="lt2"/>
-          </a:solidFill>
+          <a:noFill/>
           <a:ln w="9525" cap="flat" cmpd="sng">
-            <a:solidFill>
-              <a:schemeClr val="dk2"/>
-            </a:solidFill>
+            <a:noFill/>
             <a:prstDash val="solid"/>
             <a:round/>
             <a:headEnd type="none" w="sm" len="sm"/>
@@ -13724,19 +13590,15 @@
         </p:nvSpPr>
         <p:spPr>
           <a:xfrm>
-            <a:off x="3391300" y="4560475"/>
+            <a:off x="3391300" y="4078785"/>
             <a:ext cx="286200" cy="286200"/>
           </a:xfrm>
           <a:prstGeom prst="rect">
             <a:avLst/>
           </a:prstGeom>
-          <a:solidFill>
-            <a:schemeClr val="lt2"/>
-          </a:solidFill>
+          <a:noFill/>
           <a:ln w="9525" cap="flat" cmpd="sng">
-            <a:solidFill>
-              <a:schemeClr val="dk2"/>
-            </a:solidFill>
+            <a:noFill/>
             <a:prstDash val="solid"/>
             <a:round/>
             <a:headEnd type="none" w="sm" len="sm"/>
@@ -13774,7 +13636,7 @@
         </p:nvSpPr>
         <p:spPr>
           <a:xfrm>
-            <a:off x="3676650" y="3464225"/>
+            <a:off x="3676650" y="2982535"/>
             <a:ext cx="1658100" cy="400200"/>
           </a:xfrm>
           <a:prstGeom prst="rect">
@@ -13819,7 +13681,7 @@
         </p:nvCxnSpPr>
         <p:spPr>
           <a:xfrm>
-            <a:off x="4028350" y="4237075"/>
+            <a:off x="4028350" y="3755385"/>
             <a:ext cx="286200" cy="323400"/>
           </a:xfrm>
           <a:prstGeom prst="straightConnector1">
@@ -13848,7 +13710,7 @@
         </p:nvCxnSpPr>
         <p:spPr>
           <a:xfrm>
-            <a:off x="4314550" y="4237075"/>
+            <a:off x="4314550" y="3755385"/>
             <a:ext cx="286200" cy="323400"/>
           </a:xfrm>
           <a:prstGeom prst="straightConnector1">
@@ -13877,7 +13739,7 @@
         </p:nvCxnSpPr>
         <p:spPr>
           <a:xfrm>
-            <a:off x="4600750" y="4237075"/>
+            <a:off x="4600750" y="3755385"/>
             <a:ext cx="286200" cy="323400"/>
           </a:xfrm>
           <a:prstGeom prst="straightConnector1">
@@ -13906,7 +13768,7 @@
         </p:nvCxnSpPr>
         <p:spPr>
           <a:xfrm>
-            <a:off x="4886950" y="4237075"/>
+            <a:off x="4886950" y="3755385"/>
             <a:ext cx="533400" cy="323400"/>
           </a:xfrm>
           <a:prstGeom prst="straightConnector1">
@@ -13935,7 +13797,7 @@
         </p:nvCxnSpPr>
         <p:spPr>
           <a:xfrm>
-            <a:off x="3677500" y="4703575"/>
+            <a:off x="3677500" y="4221885"/>
             <a:ext cx="207900" cy="0"/>
           </a:xfrm>
           <a:prstGeom prst="straightConnector1">
@@ -13961,7 +13823,7 @@
         </p:nvGrpSpPr>
         <p:grpSpPr>
           <a:xfrm>
-            <a:off x="6704650" y="3950875"/>
+            <a:off x="6704650" y="3469185"/>
             <a:ext cx="1144800" cy="286200"/>
             <a:chOff x="2161225" y="2332350"/>
             <a:chExt cx="1144800" cy="286200"/>
@@ -14176,7 +14038,7 @@
         </p:nvGrpSpPr>
         <p:grpSpPr>
           <a:xfrm>
-            <a:off x="6704650" y="4560475"/>
+            <a:off x="6704650" y="4078785"/>
             <a:ext cx="1144800" cy="286200"/>
             <a:chOff x="2161225" y="2332350"/>
             <a:chExt cx="1144800" cy="286200"/>
@@ -14391,69 +14253,15 @@
         </p:nvSpPr>
         <p:spPr>
           <a:xfrm>
-            <a:off x="8096650" y="4560475"/>
+            <a:off x="8096650" y="4078785"/>
             <a:ext cx="286200" cy="286200"/>
           </a:xfrm>
           <a:prstGeom prst="rect">
             <a:avLst/>
           </a:prstGeom>
-          <a:solidFill>
-            <a:schemeClr val="lt2"/>
-          </a:solidFill>
+          <a:noFill/>
           <a:ln w="9525" cap="flat" cmpd="sng">
-            <a:solidFill>
-              <a:schemeClr val="dk2"/>
-            </a:solidFill>
-            <a:prstDash val="solid"/>
-            <a:round/>
-            <a:headEnd type="none" w="sm" len="sm"/>
-            <a:tailEnd type="none" w="sm" len="sm"/>
-          </a:ln>
-        </p:spPr>
-        <p:txBody>
-          <a:bodyPr spcFirstLastPara="1" wrap="square" lIns="91425" tIns="91425" rIns="91425" bIns="91425" anchor="ctr" anchorCtr="0">
-            <a:noAutofit/>
-          </a:bodyPr>
-          <a:lstStyle/>
-          <a:p>
-            <a:pPr marL="0" lvl="0" indent="0" algn="l" rtl="0">
-              <a:spcBef>
-                <a:spcPts val="0"/>
-              </a:spcBef>
-              <a:spcAft>
-                <a:spcPts val="0"/>
-              </a:spcAft>
-              <a:buNone/>
-            </a:pPr>
-            <a:r>
-              <a:rPr lang="en"/>
-              <a:t>0</a:t>
-            </a:r>
-            <a:endParaRPr/>
-          </a:p>
-        </p:txBody>
-      </p:sp>
-      <p:sp>
-        <p:nvSpPr>
-          <p:cNvPr id="206" name="Google Shape;206;p15"/>
-          <p:cNvSpPr/>
-          <p:nvPr/>
-        </p:nvSpPr>
-        <p:spPr>
-          <a:xfrm>
-            <a:off x="6210700" y="4560475"/>
-            <a:ext cx="286200" cy="286200"/>
-          </a:xfrm>
-          <a:prstGeom prst="rect">
-            <a:avLst/>
-          </a:prstGeom>
-          <a:solidFill>
-            <a:schemeClr val="lt2"/>
-          </a:solidFill>
-          <a:ln w="9525" cap="flat" cmpd="sng">
-            <a:solidFill>
-              <a:schemeClr val="dk2"/>
-            </a:solidFill>
+            <a:noFill/>
             <a:prstDash val="solid"/>
             <a:round/>
             <a:headEnd type="none" w="sm" len="sm"/>
@@ -14491,7 +14299,7 @@
         </p:nvSpPr>
         <p:spPr>
           <a:xfrm>
-            <a:off x="6191250" y="3464225"/>
+            <a:off x="6191250" y="2982535"/>
             <a:ext cx="1981200" cy="400200"/>
           </a:xfrm>
           <a:prstGeom prst="rect">
@@ -14536,7 +14344,7 @@
         </p:nvCxnSpPr>
         <p:spPr>
           <a:xfrm>
-            <a:off x="6847750" y="4237075"/>
+            <a:off x="6847750" y="3755385"/>
             <a:ext cx="286200" cy="323400"/>
           </a:xfrm>
           <a:prstGeom prst="straightConnector1">
@@ -14565,7 +14373,7 @@
         </p:nvCxnSpPr>
         <p:spPr>
           <a:xfrm>
-            <a:off x="7133950" y="4237075"/>
+            <a:off x="7133950" y="3755385"/>
             <a:ext cx="286200" cy="323400"/>
           </a:xfrm>
           <a:prstGeom prst="straightConnector1">
@@ -14594,7 +14402,7 @@
         </p:nvCxnSpPr>
         <p:spPr>
           <a:xfrm>
-            <a:off x="7420150" y="4237075"/>
+            <a:off x="7420150" y="3755385"/>
             <a:ext cx="286200" cy="323400"/>
           </a:xfrm>
           <a:prstGeom prst="straightConnector1">
@@ -14623,7 +14431,7 @@
         </p:nvCxnSpPr>
         <p:spPr>
           <a:xfrm>
-            <a:off x="7706350" y="4237075"/>
+            <a:off x="7706350" y="3755385"/>
             <a:ext cx="533400" cy="323400"/>
           </a:xfrm>
           <a:prstGeom prst="straightConnector1">
@@ -14652,7 +14460,7 @@
         </p:nvCxnSpPr>
         <p:spPr>
           <a:xfrm>
-            <a:off x="6847750" y="4237075"/>
+            <a:off x="6847750" y="3755385"/>
             <a:ext cx="0" cy="323400"/>
           </a:xfrm>
           <a:prstGeom prst="straightConnector1">
@@ -15397,106 +15205,6 @@
       </p:grpSp>
       <p:sp>
         <p:nvSpPr>
-          <p:cNvPr id="229" name="Google Shape;229;p16"/>
-          <p:cNvSpPr/>
-          <p:nvPr/>
-        </p:nvSpPr>
-        <p:spPr>
-          <a:xfrm>
-            <a:off x="3219850" y="4160425"/>
-            <a:ext cx="286200" cy="286200"/>
-          </a:xfrm>
-          <a:prstGeom prst="rect">
-            <a:avLst/>
-          </a:prstGeom>
-          <a:solidFill>
-            <a:schemeClr val="lt2"/>
-          </a:solidFill>
-          <a:ln w="9525" cap="flat" cmpd="sng">
-            <a:solidFill>
-              <a:schemeClr val="dk2"/>
-            </a:solidFill>
-            <a:prstDash val="solid"/>
-            <a:round/>
-            <a:headEnd type="none" w="sm" len="sm"/>
-            <a:tailEnd type="none" w="sm" len="sm"/>
-          </a:ln>
-        </p:spPr>
-        <p:txBody>
-          <a:bodyPr spcFirstLastPara="1" wrap="square" lIns="91425" tIns="91425" rIns="91425" bIns="91425" anchor="ctr" anchorCtr="0">
-            <a:noAutofit/>
-          </a:bodyPr>
-          <a:lstStyle/>
-          <a:p>
-            <a:pPr marL="0" lvl="0" indent="0" algn="l" rtl="0">
-              <a:spcBef>
-                <a:spcPts val="0"/>
-              </a:spcBef>
-              <a:spcAft>
-                <a:spcPts val="0"/>
-              </a:spcAft>
-              <a:buNone/>
-            </a:pPr>
-            <a:r>
-              <a:rPr lang="en"/>
-              <a:t>0</a:t>
-            </a:r>
-            <a:endParaRPr/>
-          </a:p>
-        </p:txBody>
-      </p:sp>
-      <p:sp>
-        <p:nvSpPr>
-          <p:cNvPr id="230" name="Google Shape;230;p16"/>
-          <p:cNvSpPr/>
-          <p:nvPr/>
-        </p:nvSpPr>
-        <p:spPr>
-          <a:xfrm>
-            <a:off x="1333900" y="4160425"/>
-            <a:ext cx="286200" cy="286200"/>
-          </a:xfrm>
-          <a:prstGeom prst="rect">
-            <a:avLst/>
-          </a:prstGeom>
-          <a:solidFill>
-            <a:schemeClr val="lt2"/>
-          </a:solidFill>
-          <a:ln w="9525" cap="flat" cmpd="sng">
-            <a:solidFill>
-              <a:schemeClr val="dk2"/>
-            </a:solidFill>
-            <a:prstDash val="solid"/>
-            <a:round/>
-            <a:headEnd type="none" w="sm" len="sm"/>
-            <a:tailEnd type="none" w="sm" len="sm"/>
-          </a:ln>
-        </p:spPr>
-        <p:txBody>
-          <a:bodyPr spcFirstLastPara="1" wrap="square" lIns="91425" tIns="91425" rIns="91425" bIns="91425" anchor="ctr" anchorCtr="0">
-            <a:noAutofit/>
-          </a:bodyPr>
-          <a:lstStyle/>
-          <a:p>
-            <a:pPr marL="0" lvl="0" indent="0" algn="l" rtl="0">
-              <a:spcBef>
-                <a:spcPts val="0"/>
-              </a:spcBef>
-              <a:spcAft>
-                <a:spcPts val="0"/>
-              </a:spcAft>
-              <a:buNone/>
-            </a:pPr>
-            <a:r>
-              <a:rPr lang="en"/>
-              <a:t>1</a:t>
-            </a:r>
-            <a:endParaRPr/>
-          </a:p>
-        </p:txBody>
-      </p:sp>
-      <p:sp>
-        <p:nvSpPr>
           <p:cNvPr id="231" name="Google Shape;231;p16"/>
           <p:cNvSpPr txBox="1"/>
           <p:nvPr/>
@@ -15541,15 +15249,15 @@
         <p:nvCxnSpPr>
           <p:cNvPr id="232" name="Google Shape;232;p16"/>
           <p:cNvCxnSpPr>
+            <a:cxnSpLocks/>
             <a:stCxn id="220" idx="2"/>
-            <a:endCxn id="230" idx="0"/>
           </p:cNvCxnSpPr>
           <p:nvPr/>
         </p:nvCxnSpPr>
         <p:spPr>
           <a:xfrm flipH="1">
-            <a:off x="1476850" y="3837025"/>
-            <a:ext cx="494100" cy="323400"/>
+            <a:off x="1477000" y="3837025"/>
+            <a:ext cx="493950" cy="609600"/>
           </a:xfrm>
           <a:prstGeom prst="straightConnector1">
             <a:avLst/>
@@ -16085,106 +15793,6 @@
       </p:grpSp>
       <p:sp>
         <p:nvSpPr>
-          <p:cNvPr id="246" name="Google Shape;246;p16"/>
-          <p:cNvSpPr/>
-          <p:nvPr/>
-        </p:nvSpPr>
-        <p:spPr>
-          <a:xfrm>
-            <a:off x="6572650" y="4160425"/>
-            <a:ext cx="286200" cy="286200"/>
-          </a:xfrm>
-          <a:prstGeom prst="rect">
-            <a:avLst/>
-          </a:prstGeom>
-          <a:solidFill>
-            <a:schemeClr val="lt2"/>
-          </a:solidFill>
-          <a:ln w="9525" cap="flat" cmpd="sng">
-            <a:solidFill>
-              <a:schemeClr val="dk2"/>
-            </a:solidFill>
-            <a:prstDash val="solid"/>
-            <a:round/>
-            <a:headEnd type="none" w="sm" len="sm"/>
-            <a:tailEnd type="none" w="sm" len="sm"/>
-          </a:ln>
-        </p:spPr>
-        <p:txBody>
-          <a:bodyPr spcFirstLastPara="1" wrap="square" lIns="91425" tIns="91425" rIns="91425" bIns="91425" anchor="ctr" anchorCtr="0">
-            <a:noAutofit/>
-          </a:bodyPr>
-          <a:lstStyle/>
-          <a:p>
-            <a:pPr marL="0" lvl="0" indent="0" algn="l" rtl="0">
-              <a:spcBef>
-                <a:spcPts val="0"/>
-              </a:spcBef>
-              <a:spcAft>
-                <a:spcPts val="0"/>
-              </a:spcAft>
-              <a:buNone/>
-            </a:pPr>
-            <a:r>
-              <a:rPr lang="en"/>
-              <a:t>0</a:t>
-            </a:r>
-            <a:endParaRPr/>
-          </a:p>
-        </p:txBody>
-      </p:sp>
-      <p:sp>
-        <p:nvSpPr>
-          <p:cNvPr id="247" name="Google Shape;247;p16"/>
-          <p:cNvSpPr/>
-          <p:nvPr/>
-        </p:nvSpPr>
-        <p:spPr>
-          <a:xfrm>
-            <a:off x="4610500" y="4160425"/>
-            <a:ext cx="286200" cy="286200"/>
-          </a:xfrm>
-          <a:prstGeom prst="rect">
-            <a:avLst/>
-          </a:prstGeom>
-          <a:solidFill>
-            <a:schemeClr val="lt2"/>
-          </a:solidFill>
-          <a:ln w="9525" cap="flat" cmpd="sng">
-            <a:solidFill>
-              <a:schemeClr val="dk2"/>
-            </a:solidFill>
-            <a:prstDash val="solid"/>
-            <a:round/>
-            <a:headEnd type="none" w="sm" len="sm"/>
-            <a:tailEnd type="none" w="sm" len="sm"/>
-          </a:ln>
-        </p:spPr>
-        <p:txBody>
-          <a:bodyPr spcFirstLastPara="1" wrap="square" lIns="91425" tIns="91425" rIns="91425" bIns="91425" anchor="ctr" anchorCtr="0">
-            <a:noAutofit/>
-          </a:bodyPr>
-          <a:lstStyle/>
-          <a:p>
-            <a:pPr marL="0" lvl="0" indent="0" algn="l" rtl="0">
-              <a:spcBef>
-                <a:spcPts val="0"/>
-              </a:spcBef>
-              <a:spcAft>
-                <a:spcPts val="0"/>
-              </a:spcAft>
-              <a:buNone/>
-            </a:pPr>
-            <a:r>
-              <a:rPr lang="en"/>
-              <a:t>0</a:t>
-            </a:r>
-            <a:endParaRPr/>
-          </a:p>
-        </p:txBody>
-      </p:sp>
-      <p:sp>
-        <p:nvSpPr>
           <p:cNvPr id="248" name="Google Shape;248;p16"/>
           <p:cNvSpPr txBox="1"/>
           <p:nvPr/>
@@ -16316,15 +15924,15 @@
         <p:nvCxnSpPr>
           <p:cNvPr id="252" name="Google Shape;252;p16"/>
           <p:cNvCxnSpPr>
+            <a:cxnSpLocks/>
             <a:stCxn id="240" idx="2"/>
-            <a:endCxn id="246" idx="0"/>
           </p:cNvCxnSpPr>
           <p:nvPr/>
         </p:nvCxnSpPr>
         <p:spPr>
           <a:xfrm>
             <a:off x="6182350" y="3837025"/>
-            <a:ext cx="533400" cy="323400"/>
+            <a:ext cx="533400" cy="609600"/>
           </a:xfrm>
           <a:prstGeom prst="straightConnector1">
             <a:avLst/>
@@ -16345,7 +15953,7 @@
         <p:nvCxnSpPr>
           <p:cNvPr id="253" name="Google Shape;253;p16"/>
           <p:cNvCxnSpPr>
-            <a:stCxn id="230" idx="2"/>
+            <a:cxnSpLocks/>
             <a:endCxn id="228" idx="2"/>
           </p:cNvCxnSpPr>
           <p:nvPr/>
@@ -16376,7 +15984,7 @@
         <p:nvCxnSpPr>
           <p:cNvPr id="254" name="Google Shape;254;p16"/>
           <p:cNvCxnSpPr>
-            <a:stCxn id="246" idx="2"/>
+            <a:cxnSpLocks/>
             <a:endCxn id="242" idx="2"/>
           </p:cNvCxnSpPr>
           <p:nvPr/>
@@ -17843,10 +17451,10 @@
                 <a:buNone/>
               </a:pPr>
               <a:r>
-                <a:rPr lang="en"/>
-                <a:t>x</a:t>
+                <a:rPr lang="en" dirty="0"/>
+                <a:t>0</a:t>
               </a:r>
-              <a:endParaRPr/>
+              <a:endParaRPr dirty="0"/>
             </a:p>
           </p:txBody>
         </p:sp>
@@ -17943,10 +17551,10 @@
                 <a:buNone/>
               </a:pPr>
               <a:r>
-                <a:rPr lang="en"/>
-                <a:t>x</a:t>
+                <a:rPr lang="en" dirty="0"/>
+                <a:t>0</a:t>
               </a:r>
-              <a:endParaRPr/>
+              <a:endParaRPr dirty="0"/>
             </a:p>
           </p:txBody>
         </p:sp>
@@ -19997,10 +19605,10 @@
               <a:buNone/>
             </a:pPr>
             <a:r>
-              <a:rPr lang="en"/>
-              <a:t>0x0F05</a:t>
+              <a:rPr lang="en" dirty="0"/>
+              <a:t>0x0F00</a:t>
             </a:r>
-            <a:endParaRPr/>
+            <a:endParaRPr dirty="0"/>
           </a:p>
         </p:txBody>
       </p:sp>
@@ -20039,10 +19647,10 @@
               <a:buNone/>
             </a:pPr>
             <a:r>
-              <a:rPr lang="en"/>
-              <a:t>A &amp; 0x0F05</a:t>
+              <a:rPr lang="en" dirty="0"/>
+              <a:t>A &amp; 0x0F00</a:t>
             </a:r>
-            <a:endParaRPr/>
+            <a:endParaRPr dirty="0"/>
           </a:p>
         </p:txBody>
       </p:sp>
@@ -20412,10 +20020,10 @@
               <a:buNone/>
             </a:pPr>
             <a:r>
-              <a:rPr lang="en"/>
-              <a:t>(A &amp; 0x0F05) &gt;&gt; 8</a:t>
+              <a:rPr lang="en" dirty="0"/>
+              <a:t>(A &amp; 0x0F00) &gt;&gt; 8</a:t>
             </a:r>
-            <a:endParaRPr/>
+            <a:endParaRPr dirty="0"/>
           </a:p>
         </p:txBody>
       </p:sp>

</xml_diff>

<commit_message>
updated lecture_ordering, and other fixes to the slides and positioning of said slides
</commit_message>
<xml_diff>
--- a/format-encodings/documents/ARCHIVE/bitwise-operations.pptx
+++ b/format-encodings/documents/ARCHIVE/bitwise-operations.pptx
@@ -6909,10 +6909,16 @@
         <p:nvGraphicFramePr>
           <p:cNvPr id="63" name="Google Shape;63;p14"/>
           <p:cNvGraphicFramePr/>
-          <p:nvPr/>
+          <p:nvPr>
+            <p:extLst>
+              <p:ext uri="{D42A27DB-BD31-4B8C-83A1-F6EECF244321}">
+                <p14:modId xmlns:p14="http://schemas.microsoft.com/office/powerpoint/2010/main" val="31717718"/>
+              </p:ext>
+            </p:extLst>
+          </p:nvPr>
         </p:nvGraphicFramePr>
         <p:xfrm>
-          <a:off x="6179375" y="155275"/>
+          <a:off x="6179375" y="343235"/>
           <a:ext cx="2863800" cy="2016415"/>
         </p:xfrm>
         <a:graphic>
@@ -7102,14 +7108,14 @@
                         <a:buNone/>
                       </a:pPr>
                       <a:r>
-                        <a:rPr lang="en">
+                        <a:rPr lang="en" dirty="0">
                           <a:solidFill>
                             <a:schemeClr val="dk1"/>
                           </a:solidFill>
                         </a:rPr>
                         <a:t>&amp;</a:t>
                       </a:r>
-                      <a:endParaRPr>
+                      <a:endParaRPr dirty="0">
                         <a:solidFill>
                           <a:schemeClr val="dk1"/>
                         </a:solidFill>
@@ -7489,10 +7495,10 @@
                         <a:buNone/>
                       </a:pPr>
                       <a:r>
-                        <a:rPr lang="en"/>
+                        <a:rPr lang="en" dirty="0"/>
                         <a:t>0</a:t>
                       </a:r>
-                      <a:endParaRPr/>
+                      <a:endParaRPr dirty="0"/>
                     </a:p>
                   </a:txBody>
                   <a:tcPr marL="91425" marR="91425" marT="91425" marB="91425">
@@ -7792,10 +7798,10 @@
                         <a:buNone/>
                       </a:pPr>
                       <a:r>
-                        <a:rPr lang="en"/>
+                        <a:rPr lang="en" dirty="0"/>
                         <a:t>1</a:t>
                       </a:r>
-                      <a:endParaRPr/>
+                      <a:endParaRPr dirty="0"/>
                     </a:p>
                   </a:txBody>
                   <a:tcPr marL="91425" marR="91425" marT="91425" marB="91425">
@@ -8035,10 +8041,10 @@
                         <a:buNone/>
                       </a:pPr>
                       <a:r>
-                        <a:rPr lang="en"/>
+                        <a:rPr lang="en" dirty="0"/>
                         <a:t>0</a:t>
                       </a:r>
-                      <a:endParaRPr/>
+                      <a:endParaRPr dirty="0"/>
                     </a:p>
                   </a:txBody>
                   <a:tcPr marL="91425" marR="91425" marT="91425" marB="91425">
@@ -8095,10 +8101,10 @@
                         <a:buNone/>
                       </a:pPr>
                       <a:r>
-                        <a:rPr lang="en"/>
+                        <a:rPr lang="en" dirty="0"/>
                         <a:t>1</a:t>
                       </a:r>
-                      <a:endParaRPr/>
+                      <a:endParaRPr dirty="0"/>
                     </a:p>
                   </a:txBody>
                   <a:tcPr marL="91425" marR="91425" marT="91425" marB="91425">
@@ -8338,10 +8344,10 @@
                         <a:buNone/>
                       </a:pPr>
                       <a:r>
-                        <a:rPr lang="en"/>
+                        <a:rPr lang="en" dirty="0"/>
                         <a:t>1</a:t>
                       </a:r>
-                      <a:endParaRPr/>
+                      <a:endParaRPr dirty="0"/>
                     </a:p>
                   </a:txBody>
                   <a:tcPr marL="91425" marR="91425" marT="91425" marB="91425">
@@ -8458,10 +8464,10 @@
                         <a:buNone/>
                       </a:pPr>
                       <a:r>
-                        <a:rPr lang="en"/>
+                        <a:rPr lang="en" dirty="0"/>
                         <a:t>0</a:t>
                       </a:r>
-                      <a:endParaRPr/>
+                      <a:endParaRPr dirty="0"/>
                     </a:p>
                   </a:txBody>
                   <a:tcPr marL="91425" marR="91425" marT="91425" marB="91425">
@@ -12312,14 +12318,81 @@
               </a:rPr>
               <a:t> $s1, $t1, 2</a:t>
             </a:r>
-            <a:br>
+          </a:p>
+          <a:p>
+            <a:pPr marL="914400" lvl="1" indent="-317500" algn="l" rtl="0">
+              <a:spcBef>
+                <a:spcPts val="0"/>
+              </a:spcBef>
+              <a:spcAft>
+                <a:spcPts val="0"/>
+              </a:spcAft>
+              <a:buSzPts val="1400"/>
+              <a:buChar char="○"/>
+            </a:pPr>
+            <a:r>
+              <a:rPr lang="en" dirty="0"/>
+              <a:t>Arithmetic Shifting a value in a register</a:t>
+            </a:r>
+          </a:p>
+          <a:p>
+            <a:pPr lvl="2">
+              <a:buChar char="○"/>
+            </a:pPr>
+            <a:r>
+              <a:rPr lang="en-US" dirty="0">
+                <a:latin typeface="Source Code Pro"/>
+                <a:ea typeface="Source Code Pro"/>
+                <a:cs typeface="Source Code Pro"/>
+                <a:sym typeface="Source Code Pro"/>
+              </a:rPr>
+              <a:t>s</a:t>
+            </a:r>
+            <a:r>
+              <a:rPr lang="en" dirty="0" err="1">
+                <a:latin typeface="Source Code Pro"/>
+                <a:ea typeface="Source Code Pro"/>
+                <a:cs typeface="Source Code Pro"/>
+                <a:sym typeface="Source Code Pro"/>
+              </a:rPr>
+              <a:t>llv</a:t>
+            </a:r>
+            <a:r>
               <a:rPr lang="en" dirty="0">
                 <a:latin typeface="Source Code Pro"/>
                 <a:ea typeface="Source Code Pro"/>
                 <a:cs typeface="Source Code Pro"/>
                 <a:sym typeface="Source Code Pro"/>
               </a:rPr>
-            </a:br>
+              <a:t>, </a:t>
+            </a:r>
+            <a:r>
+              <a:rPr lang="en" dirty="0" err="1">
+                <a:latin typeface="Source Code Pro"/>
+                <a:ea typeface="Source Code Pro"/>
+                <a:cs typeface="Source Code Pro"/>
+                <a:sym typeface="Source Code Pro"/>
+              </a:rPr>
+              <a:t>srlv</a:t>
+            </a:r>
+            <a:r>
+              <a:rPr lang="en" dirty="0">
+                <a:latin typeface="Source Code Pro"/>
+                <a:ea typeface="Source Code Pro"/>
+                <a:cs typeface="Source Code Pro"/>
+                <a:sym typeface="Source Code Pro"/>
+              </a:rPr>
+              <a:t>, </a:t>
+            </a:r>
+            <a:r>
+              <a:rPr lang="en" dirty="0" err="1">
+                <a:latin typeface="Source Code Pro"/>
+                <a:ea typeface="Source Code Pro"/>
+                <a:cs typeface="Source Code Pro"/>
+                <a:sym typeface="Source Code Pro"/>
+              </a:rPr>
+              <a:t>srav</a:t>
+            </a:r>
             <a:br>
               <a:rPr lang="en" dirty="0">
                 <a:latin typeface="Source Code Pro"/>
@@ -12404,7 +12477,7 @@
         </p:nvGrpSpPr>
         <p:grpSpPr>
           <a:xfrm>
-            <a:off x="1065850" y="3469185"/>
+            <a:off x="1065850" y="3754934"/>
             <a:ext cx="1144800" cy="286200"/>
             <a:chOff x="2161225" y="2332350"/>
             <a:chExt cx="1144800" cy="286200"/>
@@ -12619,7 +12692,7 @@
         </p:nvGrpSpPr>
         <p:grpSpPr>
           <a:xfrm>
-            <a:off x="1065850" y="4078785"/>
+            <a:off x="1065850" y="4364534"/>
             <a:ext cx="1144800" cy="286200"/>
             <a:chOff x="2161225" y="2332350"/>
             <a:chExt cx="1144800" cy="286200"/>
@@ -12834,7 +12907,7 @@
         </p:nvSpPr>
         <p:spPr>
           <a:xfrm>
-            <a:off x="2457850" y="4078785"/>
+            <a:off x="2457850" y="4364534"/>
             <a:ext cx="286200" cy="286200"/>
           </a:xfrm>
           <a:prstGeom prst="rect">
@@ -12880,7 +12953,7 @@
         </p:nvSpPr>
         <p:spPr>
           <a:xfrm>
-            <a:off x="571900" y="4078785"/>
+            <a:off x="571900" y="4364534"/>
             <a:ext cx="286200" cy="286200"/>
           </a:xfrm>
           <a:prstGeom prst="rect">
@@ -12926,7 +12999,7 @@
         </p:nvSpPr>
         <p:spPr>
           <a:xfrm>
-            <a:off x="857250" y="2982535"/>
+            <a:off x="857250" y="3268284"/>
             <a:ext cx="1658100" cy="400200"/>
           </a:xfrm>
           <a:prstGeom prst="rect">
@@ -12972,7 +13045,7 @@
         </p:nvCxnSpPr>
         <p:spPr>
           <a:xfrm flipH="1">
-            <a:off x="714850" y="3755385"/>
+            <a:off x="714850" y="4041134"/>
             <a:ext cx="494100" cy="323400"/>
           </a:xfrm>
           <a:prstGeom prst="straightConnector1">
@@ -13001,7 +13074,7 @@
         </p:nvCxnSpPr>
         <p:spPr>
           <a:xfrm flipH="1">
-            <a:off x="1208950" y="3755385"/>
+            <a:off x="1208950" y="4041134"/>
             <a:ext cx="286200" cy="323400"/>
           </a:xfrm>
           <a:prstGeom prst="straightConnector1">
@@ -13030,7 +13103,7 @@
         </p:nvCxnSpPr>
         <p:spPr>
           <a:xfrm flipH="1">
-            <a:off x="1495150" y="3755385"/>
+            <a:off x="1495150" y="4041134"/>
             <a:ext cx="286200" cy="323400"/>
           </a:xfrm>
           <a:prstGeom prst="straightConnector1">
@@ -13059,7 +13132,7 @@
         </p:nvCxnSpPr>
         <p:spPr>
           <a:xfrm flipH="1">
-            <a:off x="1781350" y="3755385"/>
+            <a:off x="1781350" y="4041134"/>
             <a:ext cx="286200" cy="323400"/>
           </a:xfrm>
           <a:prstGeom prst="straightConnector1">
@@ -13088,7 +13161,7 @@
         </p:nvCxnSpPr>
         <p:spPr>
           <a:xfrm rot="10800000">
-            <a:off x="2210650" y="4221885"/>
+            <a:off x="2210650" y="4507634"/>
             <a:ext cx="247200" cy="0"/>
           </a:xfrm>
           <a:prstGeom prst="straightConnector1">
@@ -13114,7 +13187,7 @@
         </p:nvGrpSpPr>
         <p:grpSpPr>
           <a:xfrm>
-            <a:off x="3885250" y="3469185"/>
+            <a:off x="3885250" y="3754934"/>
             <a:ext cx="1144800" cy="286200"/>
             <a:chOff x="2161225" y="2332350"/>
             <a:chExt cx="1144800" cy="286200"/>
@@ -13329,7 +13402,7 @@
         </p:nvGrpSpPr>
         <p:grpSpPr>
           <a:xfrm>
-            <a:off x="3885250" y="4078785"/>
+            <a:off x="3885250" y="4364534"/>
             <a:ext cx="1144800" cy="286200"/>
             <a:chOff x="2161225" y="2332350"/>
             <a:chExt cx="1144800" cy="286200"/>
@@ -13544,7 +13617,7 @@
         </p:nvSpPr>
         <p:spPr>
           <a:xfrm>
-            <a:off x="5277250" y="4078785"/>
+            <a:off x="5277250" y="4364534"/>
             <a:ext cx="286200" cy="286200"/>
           </a:xfrm>
           <a:prstGeom prst="rect">
@@ -13590,7 +13663,7 @@
         </p:nvSpPr>
         <p:spPr>
           <a:xfrm>
-            <a:off x="3391300" y="4078785"/>
+            <a:off x="3391300" y="4364534"/>
             <a:ext cx="286200" cy="286200"/>
           </a:xfrm>
           <a:prstGeom prst="rect">
@@ -13636,7 +13709,7 @@
         </p:nvSpPr>
         <p:spPr>
           <a:xfrm>
-            <a:off x="3676650" y="2982535"/>
+            <a:off x="3676650" y="3268284"/>
             <a:ext cx="1658100" cy="400200"/>
           </a:xfrm>
           <a:prstGeom prst="rect">
@@ -13681,7 +13754,7 @@
         </p:nvCxnSpPr>
         <p:spPr>
           <a:xfrm>
-            <a:off x="4028350" y="3755385"/>
+            <a:off x="4028350" y="4041134"/>
             <a:ext cx="286200" cy="323400"/>
           </a:xfrm>
           <a:prstGeom prst="straightConnector1">
@@ -13710,7 +13783,7 @@
         </p:nvCxnSpPr>
         <p:spPr>
           <a:xfrm>
-            <a:off x="4314550" y="3755385"/>
+            <a:off x="4314550" y="4041134"/>
             <a:ext cx="286200" cy="323400"/>
           </a:xfrm>
           <a:prstGeom prst="straightConnector1">
@@ -13739,7 +13812,7 @@
         </p:nvCxnSpPr>
         <p:spPr>
           <a:xfrm>
-            <a:off x="4600750" y="3755385"/>
+            <a:off x="4600750" y="4041134"/>
             <a:ext cx="286200" cy="323400"/>
           </a:xfrm>
           <a:prstGeom prst="straightConnector1">
@@ -13768,7 +13841,7 @@
         </p:nvCxnSpPr>
         <p:spPr>
           <a:xfrm>
-            <a:off x="4886950" y="3755385"/>
+            <a:off x="4886950" y="4041134"/>
             <a:ext cx="533400" cy="323400"/>
           </a:xfrm>
           <a:prstGeom prst="straightConnector1">
@@ -13797,7 +13870,7 @@
         </p:nvCxnSpPr>
         <p:spPr>
           <a:xfrm>
-            <a:off x="3677500" y="4221885"/>
+            <a:off x="3677500" y="4507634"/>
             <a:ext cx="207900" cy="0"/>
           </a:xfrm>
           <a:prstGeom prst="straightConnector1">
@@ -13823,7 +13896,7 @@
         </p:nvGrpSpPr>
         <p:grpSpPr>
           <a:xfrm>
-            <a:off x="6704650" y="3469185"/>
+            <a:off x="6704650" y="3754934"/>
             <a:ext cx="1144800" cy="286200"/>
             <a:chOff x="2161225" y="2332350"/>
             <a:chExt cx="1144800" cy="286200"/>
@@ -14038,7 +14111,7 @@
         </p:nvGrpSpPr>
         <p:grpSpPr>
           <a:xfrm>
-            <a:off x="6704650" y="4078785"/>
+            <a:off x="6704650" y="4364534"/>
             <a:ext cx="1144800" cy="286200"/>
             <a:chOff x="2161225" y="2332350"/>
             <a:chExt cx="1144800" cy="286200"/>
@@ -14253,7 +14326,7 @@
         </p:nvSpPr>
         <p:spPr>
           <a:xfrm>
-            <a:off x="8096650" y="4078785"/>
+            <a:off x="8096650" y="4364534"/>
             <a:ext cx="286200" cy="286200"/>
           </a:xfrm>
           <a:prstGeom prst="rect">
@@ -14299,7 +14372,7 @@
         </p:nvSpPr>
         <p:spPr>
           <a:xfrm>
-            <a:off x="6191250" y="2982535"/>
+            <a:off x="6191250" y="3268284"/>
             <a:ext cx="1981200" cy="400200"/>
           </a:xfrm>
           <a:prstGeom prst="rect">
@@ -14344,7 +14417,7 @@
         </p:nvCxnSpPr>
         <p:spPr>
           <a:xfrm>
-            <a:off x="6847750" y="3755385"/>
+            <a:off x="6847750" y="4041134"/>
             <a:ext cx="286200" cy="323400"/>
           </a:xfrm>
           <a:prstGeom prst="straightConnector1">
@@ -14373,7 +14446,7 @@
         </p:nvCxnSpPr>
         <p:spPr>
           <a:xfrm>
-            <a:off x="7133950" y="3755385"/>
+            <a:off x="7133950" y="4041134"/>
             <a:ext cx="286200" cy="323400"/>
           </a:xfrm>
           <a:prstGeom prst="straightConnector1">
@@ -14402,7 +14475,7 @@
         </p:nvCxnSpPr>
         <p:spPr>
           <a:xfrm>
-            <a:off x="7420150" y="3755385"/>
+            <a:off x="7420150" y="4041134"/>
             <a:ext cx="286200" cy="323400"/>
           </a:xfrm>
           <a:prstGeom prst="straightConnector1">
@@ -14431,7 +14504,7 @@
         </p:nvCxnSpPr>
         <p:spPr>
           <a:xfrm>
-            <a:off x="7706350" y="3755385"/>
+            <a:off x="7706350" y="4041134"/>
             <a:ext cx="533400" cy="323400"/>
           </a:xfrm>
           <a:prstGeom prst="straightConnector1">
@@ -14460,7 +14533,7 @@
         </p:nvCxnSpPr>
         <p:spPr>
           <a:xfrm>
-            <a:off x="6847750" y="3755385"/>
+            <a:off x="6847750" y="4041134"/>
             <a:ext cx="0" cy="323400"/>
           </a:xfrm>
           <a:prstGeom prst="straightConnector1">
@@ -20891,7 +20964,9 @@
           </a:prstGeom>
           <a:noFill/>
           <a:ln w="9525" cap="flat" cmpd="sng">
-            <a:noFill/>
+            <a:solidFill>
+              <a:schemeClr val="dk2"/>
+            </a:solidFill>
             <a:prstDash val="solid"/>
             <a:round/>
             <a:headEnd type="none" w="sm" len="sm"/>

</xml_diff>